<commit_message>
moved session page under performance
</commit_message>
<xml_diff>
--- a/public/OMS-Logo.pptx
+++ b/public/OMS-Logo.pptx
@@ -6,6 +6,7 @@
   </p:sldMasterIdLst>
   <p:sldIdLst>
     <p:sldId id="256" r:id="rId2"/>
+    <p:sldId id="257" r:id="rId3"/>
   </p:sldIdLst>
   <p:sldSz cx="12192000" cy="6858000"/>
   <p:notesSz cx="6858000" cy="9144000"/>
@@ -104,6 +105,11 @@
       </a:defRPr>
     </a:lvl9pPr>
   </p:defaultTextStyle>
+  <p:extLst>
+    <p:ext uri="{EFAFB233-063F-42B5-8137-9DF3F51BA10A}">
+      <p15:sldGuideLst xmlns:p15="http://schemas.microsoft.com/office/powerpoint/2012/main"/>
+    </p:ext>
+  </p:extLst>
 </p:presentation>
 </file>
 
@@ -3612,6 +3618,293 @@
 </p:sld>
 </file>
 
+<file path=ppt/slides/slide2.xml><?xml version="1.0" encoding="utf-8"?>
+<p:sld xmlns:a="http://schemas.openxmlformats.org/drawingml/2006/main" xmlns:r="http://schemas.openxmlformats.org/officeDocument/2006/relationships" xmlns:p="http://schemas.openxmlformats.org/presentationml/2006/main">
+  <p:cSld>
+    <p:bg>
+      <p:bgPr>
+        <a:solidFill>
+          <a:srgbClr val="F2F2F2"/>
+        </a:solidFill>
+        <a:effectLst/>
+      </p:bgPr>
+    </p:bg>
+    <p:spTree>
+      <p:nvGrpSpPr>
+        <p:cNvPr id="1" name=""/>
+        <p:cNvGrpSpPr/>
+        <p:nvPr/>
+      </p:nvGrpSpPr>
+      <p:grpSpPr>
+        <a:xfrm>
+          <a:off x="0" y="0"/>
+          <a:ext cx="0" cy="0"/>
+          <a:chOff x="0" y="0"/>
+          <a:chExt cx="0" cy="0"/>
+        </a:xfrm>
+      </p:grpSpPr>
+      <p:grpSp>
+        <p:nvGrpSpPr>
+          <p:cNvPr id="13" name="Group 12">
+            <a:extLst>
+              <a:ext uri="{FF2B5EF4-FFF2-40B4-BE49-F238E27FC236}">
+                <a16:creationId xmlns:a16="http://schemas.microsoft.com/office/drawing/2014/main" id="{8F5C8246-A6F6-4E1D-A7A8-983ED4243F18}"/>
+              </a:ext>
+            </a:extLst>
+          </p:cNvPr>
+          <p:cNvGrpSpPr/>
+          <p:nvPr/>
+        </p:nvGrpSpPr>
+        <p:grpSpPr>
+          <a:xfrm>
+            <a:off x="3210603" y="1803603"/>
+            <a:ext cx="5770794" cy="3250794"/>
+            <a:chOff x="1662338" y="2204287"/>
+            <a:chExt cx="5770794" cy="3250794"/>
+          </a:xfrm>
+        </p:grpSpPr>
+        <p:pic>
+          <p:nvPicPr>
+            <p:cNvPr id="10" name="Picture 9">
+              <a:extLst>
+                <a:ext uri="{FF2B5EF4-FFF2-40B4-BE49-F238E27FC236}">
+                  <a16:creationId xmlns:a16="http://schemas.microsoft.com/office/drawing/2014/main" id="{AAE54BA5-C35E-4704-ADE5-A01E616DC00A}"/>
+                </a:ext>
+              </a:extLst>
+            </p:cNvPr>
+            <p:cNvPicPr>
+              <a:picLocks noChangeAspect="1"/>
+            </p:cNvPicPr>
+            <p:nvPr/>
+          </p:nvPicPr>
+          <p:blipFill>
+            <a:blip r:embed="rId2">
+              <a:extLst>
+                <a:ext uri="{28A0092B-C50C-407E-A947-70E740481C1C}">
+                  <a14:useLocalDpi xmlns:a14="http://schemas.microsoft.com/office/drawing/2010/main" val="0"/>
+                </a:ext>
+              </a:extLst>
+            </a:blip>
+            <a:stretch>
+              <a:fillRect/>
+            </a:stretch>
+          </p:blipFill>
+          <p:spPr>
+            <a:xfrm>
+              <a:off x="1662338" y="2204287"/>
+              <a:ext cx="3250794" cy="3250794"/>
+            </a:xfrm>
+            <a:prstGeom prst="rect">
+              <a:avLst/>
+            </a:prstGeom>
+          </p:spPr>
+        </p:pic>
+        <p:sp>
+          <p:nvSpPr>
+            <p:cNvPr id="11" name="TextBox 10">
+              <a:extLst>
+                <a:ext uri="{FF2B5EF4-FFF2-40B4-BE49-F238E27FC236}">
+                  <a16:creationId xmlns:a16="http://schemas.microsoft.com/office/drawing/2014/main" id="{4C927CB8-3AA6-40A1-97BA-5273D369A34D}"/>
+                </a:ext>
+              </a:extLst>
+            </p:cNvPr>
+            <p:cNvSpPr txBox="1"/>
+            <p:nvPr/>
+          </p:nvSpPr>
+          <p:spPr>
+            <a:xfrm>
+              <a:off x="4551416" y="3475741"/>
+              <a:ext cx="2863284" cy="707886"/>
+            </a:xfrm>
+            <a:prstGeom prst="rect">
+              <a:avLst/>
+            </a:prstGeom>
+            <a:noFill/>
+          </p:spPr>
+          <p:txBody>
+            <a:bodyPr wrap="none" rtlCol="0">
+              <a:spAutoFit/>
+            </a:bodyPr>
+            <a:lstStyle/>
+            <a:p>
+              <a:r>
+                <a:rPr lang="en-SG" sz="4000" dirty="0">
+                  <a:solidFill>
+                    <a:srgbClr val="C00000"/>
+                  </a:solidFill>
+                  <a:latin typeface="Aharoni" panose="02010803020104030203" pitchFamily="2" charset="-79"/>
+                  <a:ea typeface="Yu Mincho Demibold" panose="02020600000000000000" pitchFamily="18" charset="-128"/>
+                  <a:cs typeface="Aharoni" panose="02010803020104030203" pitchFamily="2" charset="-79"/>
+                </a:rPr>
+                <a:t>M</a:t>
+              </a:r>
+              <a:r>
+                <a:rPr lang="en-SG" sz="4000" dirty="0">
+                  <a:solidFill>
+                    <a:srgbClr val="FF0000"/>
+                  </a:solidFill>
+                  <a:latin typeface="Aharoni" panose="02010803020104030203" pitchFamily="2" charset="-79"/>
+                  <a:ea typeface="Yu Mincho Demibold" panose="02020600000000000000" pitchFamily="18" charset="-128"/>
+                  <a:cs typeface="Aharoni" panose="02010803020104030203" pitchFamily="2" charset="-79"/>
+                </a:rPr>
+                <a:t>o</a:t>
+              </a:r>
+              <a:r>
+                <a:rPr lang="en-SG" sz="4000" dirty="0">
+                  <a:solidFill>
+                    <a:srgbClr val="FFC000"/>
+                  </a:solidFill>
+                  <a:latin typeface="Aharoni" panose="02010803020104030203" pitchFamily="2" charset="-79"/>
+                  <a:ea typeface="Yu Mincho Demibold" panose="02020600000000000000" pitchFamily="18" charset="-128"/>
+                  <a:cs typeface="Aharoni" panose="02010803020104030203" pitchFamily="2" charset="-79"/>
+                </a:rPr>
+                <a:t>n</a:t>
+              </a:r>
+              <a:r>
+                <a:rPr lang="en-SG" sz="4000" dirty="0">
+                  <a:solidFill>
+                    <a:srgbClr val="FFFF00"/>
+                  </a:solidFill>
+                  <a:latin typeface="Aharoni" panose="02010803020104030203" pitchFamily="2" charset="-79"/>
+                  <a:ea typeface="Yu Mincho Demibold" panose="02020600000000000000" pitchFamily="18" charset="-128"/>
+                  <a:cs typeface="Aharoni" panose="02010803020104030203" pitchFamily="2" charset="-79"/>
+                </a:rPr>
+                <a:t>i</a:t>
+              </a:r>
+              <a:r>
+                <a:rPr lang="en-SG" sz="4000" dirty="0">
+                  <a:solidFill>
+                    <a:srgbClr val="92D050"/>
+                  </a:solidFill>
+                  <a:latin typeface="Aharoni" panose="02010803020104030203" pitchFamily="2" charset="-79"/>
+                  <a:ea typeface="Yu Mincho Demibold" panose="02020600000000000000" pitchFamily="18" charset="-128"/>
+                  <a:cs typeface="Aharoni" panose="02010803020104030203" pitchFamily="2" charset="-79"/>
+                </a:rPr>
+                <a:t>t</a:t>
+              </a:r>
+              <a:r>
+                <a:rPr lang="en-SG" sz="4000" dirty="0">
+                  <a:solidFill>
+                    <a:srgbClr val="00B050"/>
+                  </a:solidFill>
+                  <a:latin typeface="Aharoni" panose="02010803020104030203" pitchFamily="2" charset="-79"/>
+                  <a:ea typeface="Yu Mincho Demibold" panose="02020600000000000000" pitchFamily="18" charset="-128"/>
+                  <a:cs typeface="Aharoni" panose="02010803020104030203" pitchFamily="2" charset="-79"/>
+                </a:rPr>
+                <a:t>o</a:t>
+              </a:r>
+              <a:r>
+                <a:rPr lang="en-SG" sz="4000" dirty="0">
+                  <a:solidFill>
+                    <a:srgbClr val="00B0F0"/>
+                  </a:solidFill>
+                  <a:latin typeface="Aharoni" panose="02010803020104030203" pitchFamily="2" charset="-79"/>
+                  <a:ea typeface="Yu Mincho Demibold" panose="02020600000000000000" pitchFamily="18" charset="-128"/>
+                  <a:cs typeface="Aharoni" panose="02010803020104030203" pitchFamily="2" charset="-79"/>
+                </a:rPr>
+                <a:t>r</a:t>
+              </a:r>
+              <a:r>
+                <a:rPr lang="en-SG" sz="4000" dirty="0">
+                  <a:solidFill>
+                    <a:srgbClr val="0070C0"/>
+                  </a:solidFill>
+                  <a:latin typeface="Aharoni" panose="02010803020104030203" pitchFamily="2" charset="-79"/>
+                  <a:ea typeface="Yu Mincho Demibold" panose="02020600000000000000" pitchFamily="18" charset="-128"/>
+                  <a:cs typeface="Aharoni" panose="02010803020104030203" pitchFamily="2" charset="-79"/>
+                </a:rPr>
+                <a:t>i</a:t>
+              </a:r>
+              <a:r>
+                <a:rPr lang="en-SG" sz="4000" dirty="0">
+                  <a:solidFill>
+                    <a:srgbClr val="7030A0"/>
+                  </a:solidFill>
+                  <a:latin typeface="Aharoni" panose="02010803020104030203" pitchFamily="2" charset="-79"/>
+                  <a:ea typeface="Yu Mincho Demibold" panose="02020600000000000000" pitchFamily="18" charset="-128"/>
+                  <a:cs typeface="Aharoni" panose="02010803020104030203" pitchFamily="2" charset="-79"/>
+                </a:rPr>
+                <a:t>n</a:t>
+              </a:r>
+              <a:r>
+                <a:rPr lang="en-SG" sz="4000" dirty="0">
+                  <a:solidFill>
+                    <a:schemeClr val="accent5">
+                      <a:lumMod val="50000"/>
+                    </a:schemeClr>
+                  </a:solidFill>
+                  <a:latin typeface="Aharoni" panose="02010803020104030203" pitchFamily="2" charset="-79"/>
+                  <a:ea typeface="Yu Mincho Demibold" panose="02020600000000000000" pitchFamily="18" charset="-128"/>
+                  <a:cs typeface="Aharoni" panose="02010803020104030203" pitchFamily="2" charset="-79"/>
+                </a:rPr>
+                <a:t>g</a:t>
+              </a:r>
+            </a:p>
+          </p:txBody>
+        </p:sp>
+        <p:sp>
+          <p:nvSpPr>
+            <p:cNvPr id="12" name="Rectangle 11">
+              <a:extLst>
+                <a:ext uri="{FF2B5EF4-FFF2-40B4-BE49-F238E27FC236}">
+                  <a16:creationId xmlns:a16="http://schemas.microsoft.com/office/drawing/2014/main" id="{D2D7D18B-F704-4DCC-B678-F5EB8779F4DC}"/>
+                </a:ext>
+              </a:extLst>
+            </p:cNvPr>
+            <p:cNvSpPr>
+              <a:spLocks/>
+            </p:cNvSpPr>
+            <p:nvPr/>
+          </p:nvSpPr>
+          <p:spPr>
+            <a:xfrm>
+              <a:off x="1673132" y="3302494"/>
+              <a:ext cx="5760000" cy="1080000"/>
+            </a:xfrm>
+            <a:prstGeom prst="rect">
+              <a:avLst/>
+            </a:prstGeom>
+            <a:noFill/>
+          </p:spPr>
+          <p:style>
+            <a:lnRef idx="2">
+              <a:schemeClr val="accent1">
+                <a:shade val="50000"/>
+              </a:schemeClr>
+            </a:lnRef>
+            <a:fillRef idx="1">
+              <a:schemeClr val="accent1"/>
+            </a:fillRef>
+            <a:effectRef idx="0">
+              <a:schemeClr val="accent1"/>
+            </a:effectRef>
+            <a:fontRef idx="minor">
+              <a:schemeClr val="lt1"/>
+            </a:fontRef>
+          </p:style>
+          <p:txBody>
+            <a:bodyPr rtlCol="0" anchor="ctr"/>
+            <a:lstStyle/>
+            <a:p>
+              <a:pPr algn="ctr"/>
+              <a:endParaRPr lang="en-SG"/>
+            </a:p>
+          </p:txBody>
+        </p:sp>
+      </p:grpSp>
+    </p:spTree>
+    <p:extLst>
+      <p:ext uri="{BB962C8B-B14F-4D97-AF65-F5344CB8AC3E}">
+        <p14:creationId xmlns:p14="http://schemas.microsoft.com/office/powerpoint/2010/main" val="1222353621"/>
+      </p:ext>
+    </p:extLst>
+  </p:cSld>
+  <p:clrMapOvr>
+    <a:masterClrMapping/>
+  </p:clrMapOvr>
+</p:sld>
+</file>
+
 <file path=ppt/theme/theme1.xml><?xml version="1.0" encoding="utf-8"?>
 <a:theme xmlns:a="http://schemas.openxmlformats.org/drawingml/2006/main" name="Office Theme">
   <a:themeElements>

</xml_diff>

<commit_message>
set sidenav to light mode
</commit_message>
<xml_diff>
--- a/public/OMS-Logo.pptx
+++ b/public/OMS-Logo.pptx
@@ -7,6 +7,7 @@
   <p:sldIdLst>
     <p:sldId id="256" r:id="rId2"/>
     <p:sldId id="257" r:id="rId3"/>
+    <p:sldId id="258" r:id="rId4"/>
   </p:sldIdLst>
   <p:sldSz cx="12192000" cy="6858000"/>
   <p:notesSz cx="6858000" cy="9144000"/>
@@ -3905,6 +3906,293 @@
 </p:sld>
 </file>
 
+<file path=ppt/slides/slide3.xml><?xml version="1.0" encoding="utf-8"?>
+<p:sld xmlns:a="http://schemas.openxmlformats.org/drawingml/2006/main" xmlns:r="http://schemas.openxmlformats.org/officeDocument/2006/relationships" xmlns:p="http://schemas.openxmlformats.org/presentationml/2006/main">
+  <p:cSld>
+    <p:bg>
+      <p:bgPr>
+        <a:solidFill>
+          <a:schemeClr val="bg1"/>
+        </a:solidFill>
+        <a:effectLst/>
+      </p:bgPr>
+    </p:bg>
+    <p:spTree>
+      <p:nvGrpSpPr>
+        <p:cNvPr id="1" name=""/>
+        <p:cNvGrpSpPr/>
+        <p:nvPr/>
+      </p:nvGrpSpPr>
+      <p:grpSpPr>
+        <a:xfrm>
+          <a:off x="0" y="0"/>
+          <a:ext cx="0" cy="0"/>
+          <a:chOff x="0" y="0"/>
+          <a:chExt cx="0" cy="0"/>
+        </a:xfrm>
+      </p:grpSpPr>
+      <p:grpSp>
+        <p:nvGrpSpPr>
+          <p:cNvPr id="13" name="Group 12">
+            <a:extLst>
+              <a:ext uri="{FF2B5EF4-FFF2-40B4-BE49-F238E27FC236}">
+                <a16:creationId xmlns:a16="http://schemas.microsoft.com/office/drawing/2014/main" id="{8F5C8246-A6F6-4E1D-A7A8-983ED4243F18}"/>
+              </a:ext>
+            </a:extLst>
+          </p:cNvPr>
+          <p:cNvGrpSpPr/>
+          <p:nvPr/>
+        </p:nvGrpSpPr>
+        <p:grpSpPr>
+          <a:xfrm>
+            <a:off x="3210603" y="1803603"/>
+            <a:ext cx="5770794" cy="3250794"/>
+            <a:chOff x="1662338" y="2204287"/>
+            <a:chExt cx="5770794" cy="3250794"/>
+          </a:xfrm>
+        </p:grpSpPr>
+        <p:pic>
+          <p:nvPicPr>
+            <p:cNvPr id="10" name="Picture 9">
+              <a:extLst>
+                <a:ext uri="{FF2B5EF4-FFF2-40B4-BE49-F238E27FC236}">
+                  <a16:creationId xmlns:a16="http://schemas.microsoft.com/office/drawing/2014/main" id="{AAE54BA5-C35E-4704-ADE5-A01E616DC00A}"/>
+                </a:ext>
+              </a:extLst>
+            </p:cNvPr>
+            <p:cNvPicPr>
+              <a:picLocks noChangeAspect="1"/>
+            </p:cNvPicPr>
+            <p:nvPr/>
+          </p:nvPicPr>
+          <p:blipFill>
+            <a:blip r:embed="rId2">
+              <a:extLst>
+                <a:ext uri="{28A0092B-C50C-407E-A947-70E740481C1C}">
+                  <a14:useLocalDpi xmlns:a14="http://schemas.microsoft.com/office/drawing/2010/main" val="0"/>
+                </a:ext>
+              </a:extLst>
+            </a:blip>
+            <a:stretch>
+              <a:fillRect/>
+            </a:stretch>
+          </p:blipFill>
+          <p:spPr>
+            <a:xfrm>
+              <a:off x="1662338" y="2204287"/>
+              <a:ext cx="3250794" cy="3250794"/>
+            </a:xfrm>
+            <a:prstGeom prst="rect">
+              <a:avLst/>
+            </a:prstGeom>
+          </p:spPr>
+        </p:pic>
+        <p:sp>
+          <p:nvSpPr>
+            <p:cNvPr id="11" name="TextBox 10">
+              <a:extLst>
+                <a:ext uri="{FF2B5EF4-FFF2-40B4-BE49-F238E27FC236}">
+                  <a16:creationId xmlns:a16="http://schemas.microsoft.com/office/drawing/2014/main" id="{4C927CB8-3AA6-40A1-97BA-5273D369A34D}"/>
+                </a:ext>
+              </a:extLst>
+            </p:cNvPr>
+            <p:cNvSpPr txBox="1"/>
+            <p:nvPr/>
+          </p:nvSpPr>
+          <p:spPr>
+            <a:xfrm>
+              <a:off x="4551416" y="3475741"/>
+              <a:ext cx="2863284" cy="707886"/>
+            </a:xfrm>
+            <a:prstGeom prst="rect">
+              <a:avLst/>
+            </a:prstGeom>
+            <a:noFill/>
+          </p:spPr>
+          <p:txBody>
+            <a:bodyPr wrap="none" rtlCol="0">
+              <a:spAutoFit/>
+            </a:bodyPr>
+            <a:lstStyle/>
+            <a:p>
+              <a:r>
+                <a:rPr lang="en-SG" sz="4000" dirty="0">
+                  <a:solidFill>
+                    <a:srgbClr val="C00000"/>
+                  </a:solidFill>
+                  <a:latin typeface="Aharoni" panose="02010803020104030203" pitchFamily="2" charset="-79"/>
+                  <a:ea typeface="Yu Mincho Demibold" panose="02020600000000000000" pitchFamily="18" charset="-128"/>
+                  <a:cs typeface="Aharoni" panose="02010803020104030203" pitchFamily="2" charset="-79"/>
+                </a:rPr>
+                <a:t>M</a:t>
+              </a:r>
+              <a:r>
+                <a:rPr lang="en-SG" sz="4000" dirty="0">
+                  <a:solidFill>
+                    <a:srgbClr val="FF0000"/>
+                  </a:solidFill>
+                  <a:latin typeface="Aharoni" panose="02010803020104030203" pitchFamily="2" charset="-79"/>
+                  <a:ea typeface="Yu Mincho Demibold" panose="02020600000000000000" pitchFamily="18" charset="-128"/>
+                  <a:cs typeface="Aharoni" panose="02010803020104030203" pitchFamily="2" charset="-79"/>
+                </a:rPr>
+                <a:t>o</a:t>
+              </a:r>
+              <a:r>
+                <a:rPr lang="en-SG" sz="4000" dirty="0">
+                  <a:solidFill>
+                    <a:srgbClr val="FFC000"/>
+                  </a:solidFill>
+                  <a:latin typeface="Aharoni" panose="02010803020104030203" pitchFamily="2" charset="-79"/>
+                  <a:ea typeface="Yu Mincho Demibold" panose="02020600000000000000" pitchFamily="18" charset="-128"/>
+                  <a:cs typeface="Aharoni" panose="02010803020104030203" pitchFamily="2" charset="-79"/>
+                </a:rPr>
+                <a:t>n</a:t>
+              </a:r>
+              <a:r>
+                <a:rPr lang="en-SG" sz="4000" dirty="0">
+                  <a:solidFill>
+                    <a:srgbClr val="FFFF00"/>
+                  </a:solidFill>
+                  <a:latin typeface="Aharoni" panose="02010803020104030203" pitchFamily="2" charset="-79"/>
+                  <a:ea typeface="Yu Mincho Demibold" panose="02020600000000000000" pitchFamily="18" charset="-128"/>
+                  <a:cs typeface="Aharoni" panose="02010803020104030203" pitchFamily="2" charset="-79"/>
+                </a:rPr>
+                <a:t>i</a:t>
+              </a:r>
+              <a:r>
+                <a:rPr lang="en-SG" sz="4000" dirty="0">
+                  <a:solidFill>
+                    <a:srgbClr val="92D050"/>
+                  </a:solidFill>
+                  <a:latin typeface="Aharoni" panose="02010803020104030203" pitchFamily="2" charset="-79"/>
+                  <a:ea typeface="Yu Mincho Demibold" panose="02020600000000000000" pitchFamily="18" charset="-128"/>
+                  <a:cs typeface="Aharoni" panose="02010803020104030203" pitchFamily="2" charset="-79"/>
+                </a:rPr>
+                <a:t>t</a:t>
+              </a:r>
+              <a:r>
+                <a:rPr lang="en-SG" sz="4000" dirty="0">
+                  <a:solidFill>
+                    <a:srgbClr val="00B050"/>
+                  </a:solidFill>
+                  <a:latin typeface="Aharoni" panose="02010803020104030203" pitchFamily="2" charset="-79"/>
+                  <a:ea typeface="Yu Mincho Demibold" panose="02020600000000000000" pitchFamily="18" charset="-128"/>
+                  <a:cs typeface="Aharoni" panose="02010803020104030203" pitchFamily="2" charset="-79"/>
+                </a:rPr>
+                <a:t>o</a:t>
+              </a:r>
+              <a:r>
+                <a:rPr lang="en-SG" sz="4000" dirty="0">
+                  <a:solidFill>
+                    <a:srgbClr val="00B0F0"/>
+                  </a:solidFill>
+                  <a:latin typeface="Aharoni" panose="02010803020104030203" pitchFamily="2" charset="-79"/>
+                  <a:ea typeface="Yu Mincho Demibold" panose="02020600000000000000" pitchFamily="18" charset="-128"/>
+                  <a:cs typeface="Aharoni" panose="02010803020104030203" pitchFamily="2" charset="-79"/>
+                </a:rPr>
+                <a:t>r</a:t>
+              </a:r>
+              <a:r>
+                <a:rPr lang="en-SG" sz="4000" dirty="0">
+                  <a:solidFill>
+                    <a:srgbClr val="0070C0"/>
+                  </a:solidFill>
+                  <a:latin typeface="Aharoni" panose="02010803020104030203" pitchFamily="2" charset="-79"/>
+                  <a:ea typeface="Yu Mincho Demibold" panose="02020600000000000000" pitchFamily="18" charset="-128"/>
+                  <a:cs typeface="Aharoni" panose="02010803020104030203" pitchFamily="2" charset="-79"/>
+                </a:rPr>
+                <a:t>i</a:t>
+              </a:r>
+              <a:r>
+                <a:rPr lang="en-SG" sz="4000" dirty="0">
+                  <a:solidFill>
+                    <a:srgbClr val="7030A0"/>
+                  </a:solidFill>
+                  <a:latin typeface="Aharoni" panose="02010803020104030203" pitchFamily="2" charset="-79"/>
+                  <a:ea typeface="Yu Mincho Demibold" panose="02020600000000000000" pitchFamily="18" charset="-128"/>
+                  <a:cs typeface="Aharoni" panose="02010803020104030203" pitchFamily="2" charset="-79"/>
+                </a:rPr>
+                <a:t>n</a:t>
+              </a:r>
+              <a:r>
+                <a:rPr lang="en-SG" sz="4000" dirty="0">
+                  <a:solidFill>
+                    <a:schemeClr val="accent5">
+                      <a:lumMod val="50000"/>
+                    </a:schemeClr>
+                  </a:solidFill>
+                  <a:latin typeface="Aharoni" panose="02010803020104030203" pitchFamily="2" charset="-79"/>
+                  <a:ea typeface="Yu Mincho Demibold" panose="02020600000000000000" pitchFamily="18" charset="-128"/>
+                  <a:cs typeface="Aharoni" panose="02010803020104030203" pitchFamily="2" charset="-79"/>
+                </a:rPr>
+                <a:t>g</a:t>
+              </a:r>
+            </a:p>
+          </p:txBody>
+        </p:sp>
+        <p:sp>
+          <p:nvSpPr>
+            <p:cNvPr id="12" name="Rectangle 11">
+              <a:extLst>
+                <a:ext uri="{FF2B5EF4-FFF2-40B4-BE49-F238E27FC236}">
+                  <a16:creationId xmlns:a16="http://schemas.microsoft.com/office/drawing/2014/main" id="{D2D7D18B-F704-4DCC-B678-F5EB8779F4DC}"/>
+                </a:ext>
+              </a:extLst>
+            </p:cNvPr>
+            <p:cNvSpPr>
+              <a:spLocks/>
+            </p:cNvSpPr>
+            <p:nvPr/>
+          </p:nvSpPr>
+          <p:spPr>
+            <a:xfrm>
+              <a:off x="1673132" y="3302494"/>
+              <a:ext cx="5760000" cy="1080000"/>
+            </a:xfrm>
+            <a:prstGeom prst="rect">
+              <a:avLst/>
+            </a:prstGeom>
+            <a:noFill/>
+          </p:spPr>
+          <p:style>
+            <a:lnRef idx="2">
+              <a:schemeClr val="accent1">
+                <a:shade val="50000"/>
+              </a:schemeClr>
+            </a:lnRef>
+            <a:fillRef idx="1">
+              <a:schemeClr val="accent1"/>
+            </a:fillRef>
+            <a:effectRef idx="0">
+              <a:schemeClr val="accent1"/>
+            </a:effectRef>
+            <a:fontRef idx="minor">
+              <a:schemeClr val="lt1"/>
+            </a:fontRef>
+          </p:style>
+          <p:txBody>
+            <a:bodyPr rtlCol="0" anchor="ctr"/>
+            <a:lstStyle/>
+            <a:p>
+              <a:pPr algn="ctr"/>
+              <a:endParaRPr lang="en-SG"/>
+            </a:p>
+          </p:txBody>
+        </p:sp>
+      </p:grpSp>
+    </p:spTree>
+    <p:extLst>
+      <p:ext uri="{BB962C8B-B14F-4D97-AF65-F5344CB8AC3E}">
+        <p14:creationId xmlns:p14="http://schemas.microsoft.com/office/powerpoint/2010/main" val="1903382768"/>
+      </p:ext>
+    </p:extLst>
+  </p:cSld>
+  <p:clrMapOvr>
+    <a:masterClrMapping/>
+  </p:clrMapOvr>
+</p:sld>
+</file>
+
 <file path=ppt/theme/theme1.xml><?xml version="1.0" encoding="utf-8"?>
 <a:theme xmlns:a="http://schemas.openxmlformats.org/drawingml/2006/main" name="Office Theme">
   <a:themeElements>

</xml_diff>